<commit_message>
chore: add document for query-classification
</commit_message>
<xml_diff>
--- a/docs/semantic-search-slide-project-nlp03-20250107.pptx
+++ b/docs/semantic-search-slide-project-nlp03-20250107.pptx
@@ -31,16 +31,17 @@
     <p:sldId id="276" r:id="rId26"/>
     <p:sldId id="277" r:id="rId27"/>
     <p:sldId id="278" r:id="rId28"/>
+    <p:sldId id="279" r:id="rId29"/>
   </p:sldIdLst>
   <p:sldSz cy="10287000" cx="18288000"/>
   <p:notesSz cx="6858000" cy="9144000"/>
   <p:embeddedFontLst>
     <p:embeddedFont>
       <p:font typeface="Inter"/>
-      <p:regular r:id="rId29"/>
-      <p:bold r:id="rId30"/>
-      <p:italic r:id="rId31"/>
-      <p:boldItalic r:id="rId32"/>
+      <p:regular r:id="rId30"/>
+      <p:bold r:id="rId31"/>
+      <p:italic r:id="rId32"/>
+      <p:boldItalic r:id="rId33"/>
     </p:embeddedFont>
   </p:embeddedFontLst>
   <p:defaultTextStyle>
@@ -288,7 +289,7 @@
       </p15:sldGuideLst>
     </p:ext>
     <p:ext uri="GoogleSlidesCustomDataVersion2">
-      <go:slidesCustomData xmlns:go="http://customooxmlschemas.google.com/" r:id="rId33" roundtripDataSignature="AMtx7mgK7nP6HtSn8jfx01fy6sOpTe14tQ=="/>
+      <go:slidesCustomData xmlns:go="http://customooxmlschemas.google.com/" r:id="rId34" roundtripDataSignature="AMtx7mhE4pk9U7+Ryp0aFzWtTJ6QpYUZjQ=="/>
     </p:ext>
   </p:extLst>
 </p:presentation>
@@ -1225,7 +1226,7 @@
       </p:grpSpPr>
       <p:sp>
         <p:nvSpPr>
-          <p:cNvPr id="167" name="Google Shape;167;g3232326fb21_0_214:notes"/>
+          <p:cNvPr id="167" name="Google Shape;167;g3232326fb21_0_236:notes"/>
           <p:cNvSpPr txBox="1"/>
           <p:nvPr>
             <p:ph idx="1" type="body"/>
@@ -1272,7 +1273,7 @@
       </p:sp>
       <p:sp>
         <p:nvSpPr>
-          <p:cNvPr id="168" name="Google Shape;168;g3232326fb21_0_214:notes"/>
+          <p:cNvPr id="168" name="Google Shape;168;g3232326fb21_0_236:notes"/>
           <p:cNvSpPr/>
           <p:nvPr>
             <p:ph idx="2" type="sldImg"/>
@@ -1342,7 +1343,7 @@
       </p:grpSpPr>
       <p:sp>
         <p:nvSpPr>
-          <p:cNvPr id="173" name="Google Shape;173;g3232326fb21_0_121:notes"/>
+          <p:cNvPr id="173" name="Google Shape;173;g3232326fb21_0_214:notes"/>
           <p:cNvSpPr txBox="1"/>
           <p:nvPr>
             <p:ph idx="1" type="body"/>
@@ -1389,7 +1390,7 @@
       </p:sp>
       <p:sp>
         <p:nvSpPr>
-          <p:cNvPr id="174" name="Google Shape;174;g3232326fb21_0_121:notes"/>
+          <p:cNvPr id="174" name="Google Shape;174;g3232326fb21_0_214:notes"/>
           <p:cNvSpPr/>
           <p:nvPr>
             <p:ph idx="2" type="sldImg"/>
@@ -1445,7 +1446,7 @@
   <p:cSld>
     <p:spTree>
       <p:nvGrpSpPr>
-        <p:cNvPr id="179" name="Shape 179"/>
+        <p:cNvPr id="178" name="Shape 178"/>
         <p:cNvGrpSpPr/>
         <p:nvPr/>
       </p:nvGrpSpPr>
@@ -1459,7 +1460,7 @@
       </p:grpSpPr>
       <p:sp>
         <p:nvSpPr>
-          <p:cNvPr id="180" name="Google Shape;180;g3232326fb21_0_221:notes"/>
+          <p:cNvPr id="179" name="Google Shape;179;g3232326fb21_0_121:notes"/>
           <p:cNvSpPr txBox="1"/>
           <p:nvPr>
             <p:ph idx="1" type="body"/>
@@ -1506,7 +1507,7 @@
       </p:sp>
       <p:sp>
         <p:nvSpPr>
-          <p:cNvPr id="181" name="Google Shape;181;g3232326fb21_0_221:notes"/>
+          <p:cNvPr id="180" name="Google Shape;180;g3232326fb21_0_121:notes"/>
           <p:cNvSpPr/>
           <p:nvPr>
             <p:ph idx="2" type="sldImg"/>
@@ -1562,7 +1563,7 @@
   <p:cSld>
     <p:spTree>
       <p:nvGrpSpPr>
-        <p:cNvPr id="184" name="Shape 184"/>
+        <p:cNvPr id="185" name="Shape 185"/>
         <p:cNvGrpSpPr/>
         <p:nvPr/>
       </p:nvGrpSpPr>
@@ -1576,7 +1577,7 @@
       </p:grpSpPr>
       <p:sp>
         <p:nvSpPr>
-          <p:cNvPr id="185" name="Google Shape;185;g3232326fb21_0_129:notes"/>
+          <p:cNvPr id="186" name="Google Shape;186;g3232326fb21_0_221:notes"/>
           <p:cNvSpPr txBox="1"/>
           <p:nvPr>
             <p:ph idx="1" type="body"/>
@@ -1623,7 +1624,7 @@
       </p:sp>
       <p:sp>
         <p:nvSpPr>
-          <p:cNvPr id="186" name="Google Shape;186;g3232326fb21_0_129:notes"/>
+          <p:cNvPr id="187" name="Google Shape;187;g3232326fb21_0_221:notes"/>
           <p:cNvSpPr/>
           <p:nvPr>
             <p:ph idx="2" type="sldImg"/>
@@ -1679,7 +1680,7 @@
   <p:cSld>
     <p:spTree>
       <p:nvGrpSpPr>
-        <p:cNvPr id="191" name="Shape 191"/>
+        <p:cNvPr id="190" name="Shape 190"/>
         <p:cNvGrpSpPr/>
         <p:nvPr/>
       </p:nvGrpSpPr>
@@ -1693,7 +1694,7 @@
       </p:grpSpPr>
       <p:sp>
         <p:nvSpPr>
-          <p:cNvPr id="192" name="Google Shape;192;g3232326fb21_0_208:notes"/>
+          <p:cNvPr id="191" name="Google Shape;191;g3232326fb21_0_129:notes"/>
           <p:cNvSpPr txBox="1"/>
           <p:nvPr>
             <p:ph idx="1" type="body"/>
@@ -1740,7 +1741,7 @@
       </p:sp>
       <p:sp>
         <p:nvSpPr>
-          <p:cNvPr id="193" name="Google Shape;193;g3232326fb21_0_208:notes"/>
+          <p:cNvPr id="192" name="Google Shape;192;g3232326fb21_0_129:notes"/>
           <p:cNvSpPr/>
           <p:nvPr>
             <p:ph idx="2" type="sldImg"/>
@@ -1796,7 +1797,7 @@
   <p:cSld>
     <p:spTree>
       <p:nvGrpSpPr>
-        <p:cNvPr id="196" name="Shape 196"/>
+        <p:cNvPr id="197" name="Shape 197"/>
         <p:cNvGrpSpPr/>
         <p:nvPr/>
       </p:nvGrpSpPr>
@@ -1810,7 +1811,7 @@
       </p:grpSpPr>
       <p:sp>
         <p:nvSpPr>
-          <p:cNvPr id="197" name="Google Shape;197;g3232326fb21_0_141:notes"/>
+          <p:cNvPr id="198" name="Google Shape;198;g3232326fb21_0_208:notes"/>
           <p:cNvSpPr txBox="1"/>
           <p:nvPr>
             <p:ph idx="1" type="body"/>
@@ -1857,7 +1858,7 @@
       </p:sp>
       <p:sp>
         <p:nvSpPr>
-          <p:cNvPr id="198" name="Google Shape;198;g3232326fb21_0_141:notes"/>
+          <p:cNvPr id="199" name="Google Shape;199;g3232326fb21_0_208:notes"/>
           <p:cNvSpPr/>
           <p:nvPr>
             <p:ph idx="2" type="sldImg"/>
@@ -1913,7 +1914,7 @@
   <p:cSld>
     <p:spTree>
       <p:nvGrpSpPr>
-        <p:cNvPr id="203" name="Shape 203"/>
+        <p:cNvPr id="202" name="Shape 202"/>
         <p:cNvGrpSpPr/>
         <p:nvPr/>
       </p:nvGrpSpPr>
@@ -1927,7 +1928,7 @@
       </p:grpSpPr>
       <p:sp>
         <p:nvSpPr>
-          <p:cNvPr id="204" name="Google Shape;204;g3232326fb21_0_149:notes"/>
+          <p:cNvPr id="203" name="Google Shape;203;g3232326fb21_0_141:notes"/>
           <p:cNvSpPr txBox="1"/>
           <p:nvPr>
             <p:ph idx="1" type="body"/>
@@ -1974,7 +1975,7 @@
       </p:sp>
       <p:sp>
         <p:nvSpPr>
-          <p:cNvPr id="205" name="Google Shape;205;g3232326fb21_0_149:notes"/>
+          <p:cNvPr id="204" name="Google Shape;204;g3232326fb21_0_141:notes"/>
           <p:cNvSpPr/>
           <p:nvPr>
             <p:ph idx="2" type="sldImg"/>
@@ -2030,7 +2031,7 @@
   <p:cSld>
     <p:spTree>
       <p:nvGrpSpPr>
-        <p:cNvPr id="210" name="Shape 210"/>
+        <p:cNvPr id="209" name="Shape 209"/>
         <p:cNvGrpSpPr/>
         <p:nvPr/>
       </p:nvGrpSpPr>
@@ -2044,7 +2045,7 @@
       </p:grpSpPr>
       <p:sp>
         <p:nvSpPr>
-          <p:cNvPr id="211" name="Google Shape;211;g3232326fb21_0_157:notes"/>
+          <p:cNvPr id="210" name="Google Shape;210;g3232326fb21_0_149:notes"/>
           <p:cNvSpPr txBox="1"/>
           <p:nvPr>
             <p:ph idx="1" type="body"/>
@@ -2091,7 +2092,7 @@
       </p:sp>
       <p:sp>
         <p:nvSpPr>
-          <p:cNvPr id="212" name="Google Shape;212;g3232326fb21_0_157:notes"/>
+          <p:cNvPr id="211" name="Google Shape;211;g3232326fb21_0_149:notes"/>
           <p:cNvSpPr/>
           <p:nvPr>
             <p:ph idx="2" type="sldImg"/>
@@ -2264,7 +2265,7 @@
   <p:cSld>
     <p:spTree>
       <p:nvGrpSpPr>
-        <p:cNvPr id="217" name="Shape 217"/>
+        <p:cNvPr id="216" name="Shape 216"/>
         <p:cNvGrpSpPr/>
         <p:nvPr/>
       </p:nvGrpSpPr>
@@ -2278,7 +2279,7 @@
       </p:grpSpPr>
       <p:sp>
         <p:nvSpPr>
-          <p:cNvPr id="218" name="Google Shape;218;g3232326fb21_0_169:notes"/>
+          <p:cNvPr id="217" name="Google Shape;217;g3232326fb21_0_157:notes"/>
           <p:cNvSpPr txBox="1"/>
           <p:nvPr>
             <p:ph idx="1" type="body"/>
@@ -2325,7 +2326,7 @@
       </p:sp>
       <p:sp>
         <p:nvSpPr>
-          <p:cNvPr id="219" name="Google Shape;219;g3232326fb21_0_169:notes"/>
+          <p:cNvPr id="218" name="Google Shape;218;g3232326fb21_0_157:notes"/>
           <p:cNvSpPr/>
           <p:nvPr>
             <p:ph idx="2" type="sldImg"/>
@@ -2381,7 +2382,7 @@
   <p:cSld>
     <p:spTree>
       <p:nvGrpSpPr>
-        <p:cNvPr id="224" name="Shape 224"/>
+        <p:cNvPr id="223" name="Shape 223"/>
         <p:cNvGrpSpPr/>
         <p:nvPr/>
       </p:nvGrpSpPr>
@@ -2395,7 +2396,7 @@
       </p:grpSpPr>
       <p:sp>
         <p:nvSpPr>
-          <p:cNvPr id="225" name="Google Shape;225;g3232326fb21_0_176:notes"/>
+          <p:cNvPr id="224" name="Google Shape;224;g3232326fb21_0_169:notes"/>
           <p:cNvSpPr txBox="1"/>
           <p:nvPr>
             <p:ph idx="1" type="body"/>
@@ -2442,7 +2443,7 @@
       </p:sp>
       <p:sp>
         <p:nvSpPr>
-          <p:cNvPr id="226" name="Google Shape;226;g3232326fb21_0_176:notes"/>
+          <p:cNvPr id="225" name="Google Shape;225;g3232326fb21_0_169:notes"/>
           <p:cNvSpPr/>
           <p:nvPr>
             <p:ph idx="2" type="sldImg"/>
@@ -2498,7 +2499,7 @@
   <p:cSld>
     <p:spTree>
       <p:nvGrpSpPr>
-        <p:cNvPr id="231" name="Shape 231"/>
+        <p:cNvPr id="230" name="Shape 230"/>
         <p:cNvGrpSpPr/>
         <p:nvPr/>
       </p:nvGrpSpPr>
@@ -2512,7 +2513,7 @@
       </p:grpSpPr>
       <p:sp>
         <p:nvSpPr>
-          <p:cNvPr id="232" name="Google Shape;232;g3232326fb21_0_201:notes"/>
+          <p:cNvPr id="231" name="Google Shape;231;g3232326fb21_0_176:notes"/>
           <p:cNvSpPr txBox="1"/>
           <p:nvPr>
             <p:ph idx="1" type="body"/>
@@ -2559,7 +2560,7 @@
       </p:sp>
       <p:sp>
         <p:nvSpPr>
-          <p:cNvPr id="233" name="Google Shape;233;g3232326fb21_0_201:notes"/>
+          <p:cNvPr id="232" name="Google Shape;232;g3232326fb21_0_176:notes"/>
           <p:cNvSpPr/>
           <p:nvPr>
             <p:ph idx="2" type="sldImg"/>
@@ -2629,7 +2630,7 @@
       </p:grpSpPr>
       <p:sp>
         <p:nvSpPr>
-          <p:cNvPr id="238" name="Google Shape;238;p14:notes"/>
+          <p:cNvPr id="238" name="Google Shape;238;g3232326fb21_0_201:notes"/>
           <p:cNvSpPr txBox="1"/>
           <p:nvPr>
             <p:ph idx="1" type="body"/>
@@ -2676,7 +2677,124 @@
       </p:sp>
       <p:sp>
         <p:nvSpPr>
-          <p:cNvPr id="239" name="Google Shape;239;p14:notes"/>
+          <p:cNvPr id="239" name="Google Shape;239;g3232326fb21_0_201:notes"/>
+          <p:cNvSpPr/>
+          <p:nvPr>
+            <p:ph idx="2" type="sldImg"/>
+          </p:nvPr>
+        </p:nvSpPr>
+        <p:spPr>
+          <a:xfrm>
+            <a:off x="1143225" y="685800"/>
+            <a:ext cx="4572300" cy="3429000"/>
+          </a:xfrm>
+          <a:custGeom>
+            <a:rect b="b" l="l" r="r" t="t"/>
+            <a:pathLst>
+              <a:path extrusionOk="0" h="120000" w="120000">
+                <a:moveTo>
+                  <a:pt x="0" y="0"/>
+                </a:moveTo>
+                <a:lnTo>
+                  <a:pt x="120000" y="0"/>
+                </a:lnTo>
+                <a:lnTo>
+                  <a:pt x="120000" y="120000"/>
+                </a:lnTo>
+                <a:lnTo>
+                  <a:pt x="0" y="120000"/>
+                </a:lnTo>
+                <a:close/>
+              </a:path>
+            </a:pathLst>
+          </a:custGeom>
+          <a:noFill/>
+          <a:ln cap="flat" cmpd="sng" w="9525">
+            <a:solidFill>
+              <a:srgbClr val="000000"/>
+            </a:solidFill>
+            <a:prstDash val="solid"/>
+            <a:round/>
+            <a:headEnd len="sm" w="sm" type="none"/>
+            <a:tailEnd len="sm" w="sm" type="none"/>
+          </a:ln>
+        </p:spPr>
+      </p:sp>
+    </p:spTree>
+  </p:cSld>
+  <p:clrMapOvr>
+    <a:masterClrMapping/>
+  </p:clrMapOvr>
+</p:notes>
+</file>
+
+<file path=ppt/notesSlides/notesSlide24.xml><?xml version="1.0" encoding="utf-8"?>
+<p:notes xmlns:a="http://schemas.openxmlformats.org/drawingml/2006/main" xmlns:r="http://schemas.openxmlformats.org/officeDocument/2006/relationships" xmlns:mc="http://schemas.openxmlformats.org/markup-compatibility/2006" xmlns:mv="urn:schemas-microsoft-com:mac:vml" xmlns:p="http://schemas.openxmlformats.org/presentationml/2006/main" xmlns:c="http://schemas.openxmlformats.org/drawingml/2006/chart" xmlns:dgm="http://schemas.openxmlformats.org/drawingml/2006/diagram" xmlns:o="urn:schemas-microsoft-com:office:office" xmlns:v="urn:schemas-microsoft-com:vml" xmlns:pvml="urn:schemas-microsoft-com:office:powerpoint" xmlns:com="http://schemas.openxmlformats.org/drawingml/2006/compatibility" xmlns:p14="http://schemas.microsoft.com/office/powerpoint/2010/main" xmlns:p15="http://schemas.microsoft.com/office/powerpoint/2012/main" xmlns:ahyp="http://schemas.microsoft.com/office/drawing/2018/hyperlinkcolor" showMasterPhAnim="0" showMasterSp="0">
+  <p:cSld>
+    <p:spTree>
+      <p:nvGrpSpPr>
+        <p:cNvPr id="243" name="Shape 243"/>
+        <p:cNvGrpSpPr/>
+        <p:nvPr/>
+      </p:nvGrpSpPr>
+      <p:grpSpPr>
+        <a:xfrm>
+          <a:off x="0" y="0"/>
+          <a:ext cx="0" cy="0"/>
+          <a:chOff x="0" y="0"/>
+          <a:chExt cx="0" cy="0"/>
+        </a:xfrm>
+      </p:grpSpPr>
+      <p:sp>
+        <p:nvSpPr>
+          <p:cNvPr id="244" name="Google Shape;244;p14:notes"/>
+          <p:cNvSpPr txBox="1"/>
+          <p:nvPr>
+            <p:ph idx="1" type="body"/>
+          </p:nvPr>
+        </p:nvSpPr>
+        <p:spPr>
+          <a:xfrm>
+            <a:off x="685800" y="4343400"/>
+            <a:ext cx="5486400" cy="4114800"/>
+          </a:xfrm>
+          <a:prstGeom prst="rect">
+            <a:avLst/>
+          </a:prstGeom>
+          <a:noFill/>
+          <a:ln>
+            <a:noFill/>
+          </a:ln>
+        </p:spPr>
+        <p:txBody>
+          <a:bodyPr anchorCtr="0" anchor="t" bIns="91425" lIns="91425" spcFirstLastPara="1" rIns="91425" wrap="square" tIns="91425">
+            <a:noAutofit/>
+          </a:bodyPr>
+          <a:lstStyle/>
+          <a:p>
+            <a:pPr indent="0" lvl="0" marL="0" rtl="0" algn="l">
+              <a:lnSpc>
+                <a:spcPct val="100000"/>
+              </a:lnSpc>
+              <a:spcBef>
+                <a:spcPts val="0"/>
+              </a:spcBef>
+              <a:spcAft>
+                <a:spcPts val="0"/>
+              </a:spcAft>
+              <a:buSzPts val="1100"/>
+              <a:buNone/>
+            </a:pPr>
+            <a:r>
+              <a:t/>
+            </a:r>
+            <a:endParaRPr/>
+          </a:p>
+        </p:txBody>
+      </p:sp>
+      <p:sp>
+        <p:nvSpPr>
+          <p:cNvPr id="245" name="Google Shape;245;p14:notes"/>
           <p:cNvSpPr/>
           <p:nvPr>
             <p:ph idx="2" type="sldImg"/>
@@ -17649,14 +17767,14 @@
       </p:grpSpPr>
       <p:sp>
         <p:nvSpPr>
-          <p:cNvPr id="170" name="Google Shape;170;g3232326fb21_0_214"/>
+          <p:cNvPr id="170" name="Google Shape;170;g3232326fb21_0_236"/>
           <p:cNvSpPr txBox="1"/>
           <p:nvPr/>
         </p:nvSpPr>
         <p:spPr>
           <a:xfrm>
             <a:off x="1157550" y="4932325"/>
-            <a:ext cx="16009830" cy="461700"/>
+            <a:ext cx="16009800" cy="461700"/>
           </a:xfrm>
           <a:prstGeom prst="rect">
             <a:avLst/>
@@ -17706,7 +17824,7 @@
       </p:sp>
       <p:pic>
         <p:nvPicPr>
-          <p:cNvPr id="171" name="Google Shape;171;g3232326fb21_0_214"/>
+          <p:cNvPr id="171" name="Google Shape;171;g3232326fb21_0_236"/>
           <p:cNvPicPr preferRelativeResize="0"/>
           <p:nvPr/>
         </p:nvPicPr>
@@ -17720,8 +17838,8 @@
         </p:blipFill>
         <p:spPr>
           <a:xfrm>
-            <a:off x="2229238" y="673213"/>
-            <a:ext cx="13829524" cy="8940575"/>
+            <a:off x="3161500" y="846763"/>
+            <a:ext cx="11632148" cy="8593477"/>
           </a:xfrm>
           <a:prstGeom prst="rect">
             <a:avLst/>
@@ -17764,9 +17882,126 @@
           <a:chExt cx="0" cy="0"/>
         </a:xfrm>
       </p:grpSpPr>
+      <p:sp>
+        <p:nvSpPr>
+          <p:cNvPr id="176" name="Google Shape;176;g3232326fb21_0_214"/>
+          <p:cNvSpPr txBox="1"/>
+          <p:nvPr/>
+        </p:nvSpPr>
+        <p:spPr>
+          <a:xfrm>
+            <a:off x="1157550" y="4932325"/>
+            <a:ext cx="16009830" cy="461700"/>
+          </a:xfrm>
+          <a:prstGeom prst="rect">
+            <a:avLst/>
+          </a:prstGeom>
+          <a:noFill/>
+          <a:ln>
+            <a:noFill/>
+          </a:ln>
+        </p:spPr>
+        <p:txBody>
+          <a:bodyPr anchorCtr="0" anchor="t" bIns="0" lIns="0" spcFirstLastPara="1" rIns="0" wrap="square" tIns="0">
+            <a:spAutoFit/>
+          </a:bodyPr>
+          <a:lstStyle/>
+          <a:p>
+            <a:pPr indent="0" lvl="0" marL="0" rtl="0" algn="l">
+              <a:lnSpc>
+                <a:spcPct val="140000"/>
+              </a:lnSpc>
+              <a:spcBef>
+                <a:spcPts val="0"/>
+              </a:spcBef>
+              <a:spcAft>
+                <a:spcPts val="0"/>
+              </a:spcAft>
+              <a:buClr>
+                <a:schemeClr val="dk1"/>
+              </a:buClr>
+              <a:buSzPts val="1100"/>
+              <a:buFont typeface="Arial"/>
+              <a:buNone/>
+            </a:pPr>
+            <a:r>
+              <a:t/>
+            </a:r>
+            <a:endParaRPr sz="3000">
+              <a:solidFill>
+                <a:schemeClr val="dk1"/>
+              </a:solidFill>
+              <a:latin typeface="Inter"/>
+              <a:ea typeface="Inter"/>
+              <a:cs typeface="Inter"/>
+              <a:sym typeface="Inter"/>
+            </a:endParaRPr>
+          </a:p>
+        </p:txBody>
+      </p:sp>
+      <p:pic>
+        <p:nvPicPr>
+          <p:cNvPr id="177" name="Google Shape;177;g3232326fb21_0_214"/>
+          <p:cNvPicPr preferRelativeResize="0"/>
+          <p:nvPr/>
+        </p:nvPicPr>
+        <p:blipFill>
+          <a:blip r:embed="rId3">
+            <a:alphaModFix/>
+          </a:blip>
+          <a:stretch>
+            <a:fillRect/>
+          </a:stretch>
+        </p:blipFill>
+        <p:spPr>
+          <a:xfrm>
+            <a:off x="2229238" y="673213"/>
+            <a:ext cx="13829524" cy="8940575"/>
+          </a:xfrm>
+          <a:prstGeom prst="rect">
+            <a:avLst/>
+          </a:prstGeom>
+          <a:noFill/>
+          <a:ln>
+            <a:noFill/>
+          </a:ln>
+        </p:spPr>
+      </p:pic>
+    </p:spTree>
+  </p:cSld>
+  <p:clrMapOvr>
+    <a:masterClrMapping/>
+  </p:clrMapOvr>
+</p:sld>
+</file>
+
+<file path=ppt/slides/slide14.xml><?xml version="1.0" encoding="utf-8"?>
+<p:sld xmlns:a="http://schemas.openxmlformats.org/drawingml/2006/main" xmlns:r="http://schemas.openxmlformats.org/officeDocument/2006/relationships" xmlns:mc="http://schemas.openxmlformats.org/markup-compatibility/2006" xmlns:mv="urn:schemas-microsoft-com:mac:vml" xmlns:p="http://schemas.openxmlformats.org/presentationml/2006/main" xmlns:c="http://schemas.openxmlformats.org/drawingml/2006/chart" xmlns:dgm="http://schemas.openxmlformats.org/drawingml/2006/diagram" xmlns:o="urn:schemas-microsoft-com:office:office" xmlns:v="urn:schemas-microsoft-com:vml" xmlns:pvml="urn:schemas-microsoft-com:office:powerpoint" xmlns:com="http://schemas.openxmlformats.org/drawingml/2006/compatibility" xmlns:p14="http://schemas.microsoft.com/office/powerpoint/2010/main" xmlns:p15="http://schemas.microsoft.com/office/powerpoint/2012/main" xmlns:ahyp="http://schemas.microsoft.com/office/drawing/2018/hyperlinkcolor">
+  <p:cSld>
+    <p:bg>
+      <p:bgPr>
+        <a:solidFill>
+          <a:srgbClr val="F1F1F1"/>
+        </a:solidFill>
+      </p:bgPr>
+    </p:bg>
+    <p:spTree>
+      <p:nvGrpSpPr>
+        <p:cNvPr id="181" name="Shape 181"/>
+        <p:cNvGrpSpPr/>
+        <p:nvPr/>
+      </p:nvGrpSpPr>
+      <p:grpSpPr>
+        <a:xfrm>
+          <a:off x="0" y="0"/>
+          <a:ext cx="0" cy="0"/>
+          <a:chOff x="0" y="0"/>
+          <a:chExt cx="0" cy="0"/>
+        </a:xfrm>
+      </p:grpSpPr>
       <p:grpSp>
         <p:nvGrpSpPr>
-          <p:cNvPr id="176" name="Google Shape;176;g3232326fb21_0_121"/>
+          <p:cNvPr id="182" name="Google Shape;182;g3232326fb21_0_121"/>
           <p:cNvGrpSpPr/>
           <p:nvPr/>
         </p:nvGrpSpPr>
@@ -17780,7 +18015,7 @@
         </p:grpSpPr>
         <p:sp>
           <p:nvSpPr>
-            <p:cNvPr id="177" name="Google Shape;177;g3232326fb21_0_121"/>
+            <p:cNvPr id="183" name="Google Shape;183;g3232326fb21_0_121"/>
             <p:cNvSpPr txBox="1"/>
             <p:nvPr/>
           </p:nvSpPr>
@@ -17846,7 +18081,7 @@
         </p:sp>
         <p:sp>
           <p:nvSpPr>
-            <p:cNvPr id="178" name="Google Shape;178;g3232326fb21_0_121"/>
+            <p:cNvPr id="184" name="Google Shape;184;g3232326fb21_0_121"/>
             <p:cNvSpPr txBox="1"/>
             <p:nvPr/>
           </p:nvSpPr>
@@ -18047,7 +18282,7 @@
 </p:sld>
 </file>
 
-<file path=ppt/slides/slide14.xml><?xml version="1.0" encoding="utf-8"?>
+<file path=ppt/slides/slide15.xml><?xml version="1.0" encoding="utf-8"?>
 <p:sld xmlns:a="http://schemas.openxmlformats.org/drawingml/2006/main" xmlns:r="http://schemas.openxmlformats.org/officeDocument/2006/relationships" xmlns:mc="http://schemas.openxmlformats.org/markup-compatibility/2006" xmlns:mv="urn:schemas-microsoft-com:mac:vml" xmlns:p="http://schemas.openxmlformats.org/presentationml/2006/main" xmlns:c="http://schemas.openxmlformats.org/drawingml/2006/chart" xmlns:dgm="http://schemas.openxmlformats.org/drawingml/2006/diagram" xmlns:o="urn:schemas-microsoft-com:office:office" xmlns:v="urn:schemas-microsoft-com:vml" xmlns:pvml="urn:schemas-microsoft-com:office:powerpoint" xmlns:com="http://schemas.openxmlformats.org/drawingml/2006/compatibility" xmlns:p14="http://schemas.microsoft.com/office/powerpoint/2010/main" xmlns:p15="http://schemas.microsoft.com/office/powerpoint/2012/main" xmlns:ahyp="http://schemas.microsoft.com/office/drawing/2018/hyperlinkcolor">
   <p:cSld>
     <p:bg>
@@ -18059,7 +18294,7 @@
     </p:bg>
     <p:spTree>
       <p:nvGrpSpPr>
-        <p:cNvPr id="182" name="Shape 182"/>
+        <p:cNvPr id="188" name="Shape 188"/>
         <p:cNvGrpSpPr/>
         <p:nvPr/>
       </p:nvGrpSpPr>
@@ -18073,7 +18308,7 @@
       </p:grpSpPr>
       <p:pic>
         <p:nvPicPr>
-          <p:cNvPr id="183" name="Google Shape;183;g3232326fb21_0_221"/>
+          <p:cNvPr id="189" name="Google Shape;189;g3232326fb21_0_221"/>
           <p:cNvPicPr preferRelativeResize="0"/>
           <p:nvPr/>
         </p:nvPicPr>
@@ -18107,7 +18342,7 @@
 </p:sld>
 </file>
 
-<file path=ppt/slides/slide15.xml><?xml version="1.0" encoding="utf-8"?>
+<file path=ppt/slides/slide16.xml><?xml version="1.0" encoding="utf-8"?>
 <p:sld xmlns:a="http://schemas.openxmlformats.org/drawingml/2006/main" xmlns:r="http://schemas.openxmlformats.org/officeDocument/2006/relationships" xmlns:mc="http://schemas.openxmlformats.org/markup-compatibility/2006" xmlns:mv="urn:schemas-microsoft-com:mac:vml" xmlns:p="http://schemas.openxmlformats.org/presentationml/2006/main" xmlns:c="http://schemas.openxmlformats.org/drawingml/2006/chart" xmlns:dgm="http://schemas.openxmlformats.org/drawingml/2006/diagram" xmlns:o="urn:schemas-microsoft-com:office:office" xmlns:v="urn:schemas-microsoft-com:vml" xmlns:pvml="urn:schemas-microsoft-com:office:powerpoint" xmlns:com="http://schemas.openxmlformats.org/drawingml/2006/compatibility" xmlns:p14="http://schemas.microsoft.com/office/powerpoint/2010/main" xmlns:p15="http://schemas.microsoft.com/office/powerpoint/2012/main" xmlns:ahyp="http://schemas.microsoft.com/office/drawing/2018/hyperlinkcolor">
   <p:cSld>
     <p:bg>
@@ -18119,7 +18354,7 @@
     </p:bg>
     <p:spTree>
       <p:nvGrpSpPr>
-        <p:cNvPr id="187" name="Shape 187"/>
+        <p:cNvPr id="193" name="Shape 193"/>
         <p:cNvGrpSpPr/>
         <p:nvPr/>
       </p:nvGrpSpPr>
@@ -18133,7 +18368,7 @@
       </p:grpSpPr>
       <p:grpSp>
         <p:nvGrpSpPr>
-          <p:cNvPr id="188" name="Google Shape;188;g3232326fb21_0_129"/>
+          <p:cNvPr id="194" name="Google Shape;194;g3232326fb21_0_129"/>
           <p:cNvGrpSpPr/>
           <p:nvPr/>
         </p:nvGrpSpPr>
@@ -18147,7 +18382,7 @@
         </p:grpSpPr>
         <p:sp>
           <p:nvSpPr>
-            <p:cNvPr id="189" name="Google Shape;189;g3232326fb21_0_129"/>
+            <p:cNvPr id="195" name="Google Shape;195;g3232326fb21_0_129"/>
             <p:cNvSpPr txBox="1"/>
             <p:nvPr/>
           </p:nvSpPr>
@@ -18213,7 +18448,7 @@
         </p:sp>
         <p:sp>
           <p:nvSpPr>
-            <p:cNvPr id="190" name="Google Shape;190;g3232326fb21_0_129"/>
+            <p:cNvPr id="196" name="Google Shape;196;g3232326fb21_0_129"/>
             <p:cNvSpPr txBox="1"/>
             <p:nvPr/>
           </p:nvSpPr>
@@ -18426,7 +18661,7 @@
 </p:sld>
 </file>
 
-<file path=ppt/slides/slide16.xml><?xml version="1.0" encoding="utf-8"?>
+<file path=ppt/slides/slide17.xml><?xml version="1.0" encoding="utf-8"?>
 <p:sld xmlns:a="http://schemas.openxmlformats.org/drawingml/2006/main" xmlns:r="http://schemas.openxmlformats.org/officeDocument/2006/relationships" xmlns:mc="http://schemas.openxmlformats.org/markup-compatibility/2006" xmlns:mv="urn:schemas-microsoft-com:mac:vml" xmlns:p="http://schemas.openxmlformats.org/presentationml/2006/main" xmlns:c="http://schemas.openxmlformats.org/drawingml/2006/chart" xmlns:dgm="http://schemas.openxmlformats.org/drawingml/2006/diagram" xmlns:o="urn:schemas-microsoft-com:office:office" xmlns:v="urn:schemas-microsoft-com:vml" xmlns:pvml="urn:schemas-microsoft-com:office:powerpoint" xmlns:com="http://schemas.openxmlformats.org/drawingml/2006/compatibility" xmlns:p14="http://schemas.microsoft.com/office/powerpoint/2010/main" xmlns:p15="http://schemas.microsoft.com/office/powerpoint/2012/main" xmlns:ahyp="http://schemas.microsoft.com/office/drawing/2018/hyperlinkcolor">
   <p:cSld>
     <p:bg>
@@ -18438,7 +18673,7 @@
     </p:bg>
     <p:spTree>
       <p:nvGrpSpPr>
-        <p:cNvPr id="194" name="Shape 194"/>
+        <p:cNvPr id="200" name="Shape 200"/>
         <p:cNvGrpSpPr/>
         <p:nvPr/>
       </p:nvGrpSpPr>
@@ -18452,7 +18687,7 @@
       </p:grpSpPr>
       <p:pic>
         <p:nvPicPr>
-          <p:cNvPr id="195" name="Google Shape;195;g3232326fb21_0_208"/>
+          <p:cNvPr id="201" name="Google Shape;201;g3232326fb21_0_208"/>
           <p:cNvPicPr preferRelativeResize="0"/>
           <p:nvPr/>
         </p:nvPicPr>
@@ -18486,7 +18721,7 @@
 </p:sld>
 </file>
 
-<file path=ppt/slides/slide17.xml><?xml version="1.0" encoding="utf-8"?>
+<file path=ppt/slides/slide18.xml><?xml version="1.0" encoding="utf-8"?>
 <p:sld xmlns:a="http://schemas.openxmlformats.org/drawingml/2006/main" xmlns:r="http://schemas.openxmlformats.org/officeDocument/2006/relationships" xmlns:mc="http://schemas.openxmlformats.org/markup-compatibility/2006" xmlns:mv="urn:schemas-microsoft-com:mac:vml" xmlns:p="http://schemas.openxmlformats.org/presentationml/2006/main" xmlns:c="http://schemas.openxmlformats.org/drawingml/2006/chart" xmlns:dgm="http://schemas.openxmlformats.org/drawingml/2006/diagram" xmlns:o="urn:schemas-microsoft-com:office:office" xmlns:v="urn:schemas-microsoft-com:vml" xmlns:pvml="urn:schemas-microsoft-com:office:powerpoint" xmlns:com="http://schemas.openxmlformats.org/drawingml/2006/compatibility" xmlns:p14="http://schemas.microsoft.com/office/powerpoint/2010/main" xmlns:p15="http://schemas.microsoft.com/office/powerpoint/2012/main" xmlns:ahyp="http://schemas.microsoft.com/office/drawing/2018/hyperlinkcolor">
   <p:cSld>
     <p:bg>
@@ -18498,7 +18733,7 @@
     </p:bg>
     <p:spTree>
       <p:nvGrpSpPr>
-        <p:cNvPr id="199" name="Shape 199"/>
+        <p:cNvPr id="205" name="Shape 205"/>
         <p:cNvGrpSpPr/>
         <p:nvPr/>
       </p:nvGrpSpPr>
@@ -18512,7 +18747,7 @@
       </p:grpSpPr>
       <p:grpSp>
         <p:nvGrpSpPr>
-          <p:cNvPr id="200" name="Google Shape;200;g3232326fb21_0_141"/>
+          <p:cNvPr id="206" name="Google Shape;206;g3232326fb21_0_141"/>
           <p:cNvGrpSpPr/>
           <p:nvPr/>
         </p:nvGrpSpPr>
@@ -18526,7 +18761,7 @@
         </p:grpSpPr>
         <p:sp>
           <p:nvSpPr>
-            <p:cNvPr id="201" name="Google Shape;201;g3232326fb21_0_141"/>
+            <p:cNvPr id="207" name="Google Shape;207;g3232326fb21_0_141"/>
             <p:cNvSpPr txBox="1"/>
             <p:nvPr/>
           </p:nvSpPr>
@@ -18592,7 +18827,7 @@
         </p:sp>
         <p:sp>
           <p:nvSpPr>
-            <p:cNvPr id="202" name="Google Shape;202;g3232326fb21_0_141"/>
+            <p:cNvPr id="208" name="Google Shape;208;g3232326fb21_0_141"/>
             <p:cNvSpPr txBox="1"/>
             <p:nvPr/>
           </p:nvSpPr>
@@ -18944,7 +19179,7 @@
 </p:sld>
 </file>
 
-<file path=ppt/slides/slide18.xml><?xml version="1.0" encoding="utf-8"?>
+<file path=ppt/slides/slide19.xml><?xml version="1.0" encoding="utf-8"?>
 <p:sld xmlns:a="http://schemas.openxmlformats.org/drawingml/2006/main" xmlns:r="http://schemas.openxmlformats.org/officeDocument/2006/relationships" xmlns:mc="http://schemas.openxmlformats.org/markup-compatibility/2006" xmlns:mv="urn:schemas-microsoft-com:mac:vml" xmlns:p="http://schemas.openxmlformats.org/presentationml/2006/main" xmlns:c="http://schemas.openxmlformats.org/drawingml/2006/chart" xmlns:dgm="http://schemas.openxmlformats.org/drawingml/2006/diagram" xmlns:o="urn:schemas-microsoft-com:office:office" xmlns:v="urn:schemas-microsoft-com:vml" xmlns:pvml="urn:schemas-microsoft-com:office:powerpoint" xmlns:com="http://schemas.openxmlformats.org/drawingml/2006/compatibility" xmlns:p14="http://schemas.microsoft.com/office/powerpoint/2010/main" xmlns:p15="http://schemas.microsoft.com/office/powerpoint/2012/main" xmlns:ahyp="http://schemas.microsoft.com/office/drawing/2018/hyperlinkcolor">
   <p:cSld>
     <p:bg>
@@ -18956,7 +19191,7 @@
     </p:bg>
     <p:spTree>
       <p:nvGrpSpPr>
-        <p:cNvPr id="206" name="Shape 206"/>
+        <p:cNvPr id="212" name="Shape 212"/>
         <p:cNvGrpSpPr/>
         <p:nvPr/>
       </p:nvGrpSpPr>
@@ -18970,7 +19205,7 @@
       </p:grpSpPr>
       <p:grpSp>
         <p:nvGrpSpPr>
-          <p:cNvPr id="207" name="Google Shape;207;g3232326fb21_0_149"/>
+          <p:cNvPr id="213" name="Google Shape;213;g3232326fb21_0_149"/>
           <p:cNvGrpSpPr/>
           <p:nvPr/>
         </p:nvGrpSpPr>
@@ -18984,7 +19219,7 @@
         </p:grpSpPr>
         <p:sp>
           <p:nvSpPr>
-            <p:cNvPr id="208" name="Google Shape;208;g3232326fb21_0_149"/>
+            <p:cNvPr id="214" name="Google Shape;214;g3232326fb21_0_149"/>
             <p:cNvSpPr txBox="1"/>
             <p:nvPr/>
           </p:nvSpPr>
@@ -19050,7 +19285,7 @@
         </p:sp>
         <p:sp>
           <p:nvSpPr>
-            <p:cNvPr id="209" name="Google Shape;209;g3232326fb21_0_149"/>
+            <p:cNvPr id="215" name="Google Shape;215;g3232326fb21_0_149"/>
             <p:cNvSpPr txBox="1"/>
             <p:nvPr/>
           </p:nvSpPr>
@@ -19372,377 +19607,6 @@
                   <a:sym typeface="Inter"/>
                 </a:rPr>
                 <a:t>	•	Test: bash scripts/test.sh</a:t>
-              </a:r>
-              <a:endParaRPr sz="3000">
-                <a:solidFill>
-                  <a:schemeClr val="dk1"/>
-                </a:solidFill>
-                <a:latin typeface="Inter"/>
-                <a:ea typeface="Inter"/>
-                <a:cs typeface="Inter"/>
-                <a:sym typeface="Inter"/>
-              </a:endParaRPr>
-            </a:p>
-          </p:txBody>
-        </p:sp>
-      </p:grpSp>
-    </p:spTree>
-  </p:cSld>
-  <p:clrMapOvr>
-    <a:masterClrMapping/>
-  </p:clrMapOvr>
-</p:sld>
-</file>
-
-<file path=ppt/slides/slide19.xml><?xml version="1.0" encoding="utf-8"?>
-<p:sld xmlns:a="http://schemas.openxmlformats.org/drawingml/2006/main" xmlns:r="http://schemas.openxmlformats.org/officeDocument/2006/relationships" xmlns:mc="http://schemas.openxmlformats.org/markup-compatibility/2006" xmlns:mv="urn:schemas-microsoft-com:mac:vml" xmlns:p="http://schemas.openxmlformats.org/presentationml/2006/main" xmlns:c="http://schemas.openxmlformats.org/drawingml/2006/chart" xmlns:dgm="http://schemas.openxmlformats.org/drawingml/2006/diagram" xmlns:o="urn:schemas-microsoft-com:office:office" xmlns:v="urn:schemas-microsoft-com:vml" xmlns:pvml="urn:schemas-microsoft-com:office:powerpoint" xmlns:com="http://schemas.openxmlformats.org/drawingml/2006/compatibility" xmlns:p14="http://schemas.microsoft.com/office/powerpoint/2010/main" xmlns:p15="http://schemas.microsoft.com/office/powerpoint/2012/main" xmlns:ahyp="http://schemas.microsoft.com/office/drawing/2018/hyperlinkcolor">
-  <p:cSld>
-    <p:bg>
-      <p:bgPr>
-        <a:solidFill>
-          <a:srgbClr val="F1F1F1"/>
-        </a:solidFill>
-      </p:bgPr>
-    </p:bg>
-    <p:spTree>
-      <p:nvGrpSpPr>
-        <p:cNvPr id="213" name="Shape 213"/>
-        <p:cNvGrpSpPr/>
-        <p:nvPr/>
-      </p:nvGrpSpPr>
-      <p:grpSpPr>
-        <a:xfrm>
-          <a:off x="0" y="0"/>
-          <a:ext cx="0" cy="0"/>
-          <a:chOff x="0" y="0"/>
-          <a:chExt cx="0" cy="0"/>
-        </a:xfrm>
-      </p:grpSpPr>
-      <p:grpSp>
-        <p:nvGrpSpPr>
-          <p:cNvPr id="214" name="Google Shape;214;g3232326fb21_0_157"/>
-          <p:cNvGrpSpPr/>
-          <p:nvPr/>
-        </p:nvGrpSpPr>
-        <p:grpSpPr>
-          <a:xfrm>
-            <a:off x="1157550" y="2186825"/>
-            <a:ext cx="16009831" cy="5146700"/>
-            <a:chOff x="-16" y="0"/>
-            <a:chExt cx="21132300" cy="6862267"/>
-          </a:xfrm>
-        </p:grpSpPr>
-        <p:sp>
-          <p:nvSpPr>
-            <p:cNvPr id="215" name="Google Shape;215;g3232326fb21_0_157"/>
-            <p:cNvSpPr txBox="1"/>
-            <p:nvPr/>
-          </p:nvSpPr>
-          <p:spPr>
-            <a:xfrm>
-              <a:off x="-16" y="0"/>
-              <a:ext cx="21132300" cy="1539000"/>
-            </a:xfrm>
-            <a:prstGeom prst="rect">
-              <a:avLst/>
-            </a:prstGeom>
-            <a:noFill/>
-            <a:ln>
-              <a:noFill/>
-            </a:ln>
-          </p:spPr>
-          <p:txBody>
-            <a:bodyPr anchorCtr="0" anchor="t" bIns="0" lIns="0" spcFirstLastPara="1" rIns="0" wrap="square" tIns="0">
-              <a:spAutoFit/>
-            </a:bodyPr>
-            <a:lstStyle/>
-            <a:p>
-              <a:pPr indent="0" lvl="0" marL="0" rtl="0" algn="l">
-                <a:lnSpc>
-                  <a:spcPct val="120002"/>
-                </a:lnSpc>
-                <a:spcBef>
-                  <a:spcPts val="0"/>
-                </a:spcBef>
-                <a:spcAft>
-                  <a:spcPts val="0"/>
-                </a:spcAft>
-                <a:buClr>
-                  <a:schemeClr val="dk1"/>
-                </a:buClr>
-                <a:buSzPts val="7499"/>
-                <a:buFont typeface="Arial"/>
-                <a:buNone/>
-              </a:pPr>
-              <a:r>
-                <a:rPr b="1" lang="en-US" sz="7499">
-                  <a:solidFill>
-                    <a:srgbClr val="9976FF"/>
-                  </a:solidFill>
-                  <a:latin typeface="Inter"/>
-                  <a:ea typeface="Inter"/>
-                  <a:cs typeface="Inter"/>
-                  <a:sym typeface="Inter"/>
-                </a:rPr>
-                <a:t>Comparison of Approaches</a:t>
-              </a:r>
-              <a:endParaRPr b="1" sz="7499">
-                <a:solidFill>
-                  <a:srgbClr val="9976FF"/>
-                </a:solidFill>
-                <a:latin typeface="Inter"/>
-                <a:ea typeface="Inter"/>
-                <a:cs typeface="Inter"/>
-                <a:sym typeface="Inter"/>
-              </a:endParaRPr>
-            </a:p>
-          </p:txBody>
-        </p:sp>
-        <p:sp>
-          <p:nvSpPr>
-            <p:cNvPr id="216" name="Google Shape;216;g3232326fb21_0_157"/>
-            <p:cNvSpPr txBox="1"/>
-            <p:nvPr/>
-          </p:nvSpPr>
-          <p:spPr>
-            <a:xfrm>
-              <a:off x="-16" y="3660667"/>
-              <a:ext cx="21132300" cy="3201600"/>
-            </a:xfrm>
-            <a:prstGeom prst="rect">
-              <a:avLst/>
-            </a:prstGeom>
-            <a:noFill/>
-            <a:ln>
-              <a:noFill/>
-            </a:ln>
-          </p:spPr>
-          <p:txBody>
-            <a:bodyPr anchorCtr="0" anchor="t" bIns="0" lIns="0" spcFirstLastPara="1" rIns="0" wrap="square" tIns="0">
-              <a:spAutoFit/>
-            </a:bodyPr>
-            <a:lstStyle/>
-            <a:p>
-              <a:pPr indent="0" lvl="0" marL="0" rtl="0" algn="l">
-                <a:lnSpc>
-                  <a:spcPct val="140000"/>
-                </a:lnSpc>
-                <a:spcBef>
-                  <a:spcPts val="0"/>
-                </a:spcBef>
-                <a:spcAft>
-                  <a:spcPts val="0"/>
-                </a:spcAft>
-                <a:buClr>
-                  <a:schemeClr val="dk1"/>
-                </a:buClr>
-                <a:buSzPts val="1100"/>
-                <a:buFont typeface="Arial"/>
-                <a:buNone/>
-              </a:pPr>
-              <a:r>
-                <a:rPr b="1" lang="en-US" sz="3000">
-                  <a:solidFill>
-                    <a:schemeClr val="dk1"/>
-                  </a:solidFill>
-                  <a:latin typeface="Inter"/>
-                  <a:ea typeface="Inter"/>
-                  <a:cs typeface="Inter"/>
-                  <a:sym typeface="Inter"/>
-                </a:rPr>
-                <a:t>Search Methods</a:t>
-              </a:r>
-              <a:endParaRPr b="1" sz="3000">
-                <a:solidFill>
-                  <a:schemeClr val="dk1"/>
-                </a:solidFill>
-                <a:latin typeface="Inter"/>
-                <a:ea typeface="Inter"/>
-                <a:cs typeface="Inter"/>
-                <a:sym typeface="Inter"/>
-              </a:endParaRPr>
-            </a:p>
-            <a:p>
-              <a:pPr indent="0" lvl="0" marL="0" rtl="0" algn="l">
-                <a:lnSpc>
-                  <a:spcPct val="140000"/>
-                </a:lnSpc>
-                <a:spcBef>
-                  <a:spcPts val="0"/>
-                </a:spcBef>
-                <a:spcAft>
-                  <a:spcPts val="0"/>
-                </a:spcAft>
-                <a:buClr>
-                  <a:schemeClr val="dk1"/>
-                </a:buClr>
-                <a:buSzPts val="1100"/>
-                <a:buFont typeface="Arial"/>
-                <a:buNone/>
-              </a:pPr>
-              <a:r>
-                <a:rPr lang="en-US" sz="3000">
-                  <a:solidFill>
-                    <a:schemeClr val="dk1"/>
-                  </a:solidFill>
-                  <a:latin typeface="Inter"/>
-                  <a:ea typeface="Inter"/>
-                  <a:cs typeface="Inter"/>
-                  <a:sym typeface="Inter"/>
-                </a:rPr>
-                <a:t>	•	</a:t>
-              </a:r>
-              <a:r>
-                <a:rPr b="1" lang="en-US" sz="3000">
-                  <a:solidFill>
-                    <a:schemeClr val="dk1"/>
-                  </a:solidFill>
-                  <a:latin typeface="Inter"/>
-                  <a:ea typeface="Inter"/>
-                  <a:cs typeface="Inter"/>
-                  <a:sym typeface="Inter"/>
-                </a:rPr>
-                <a:t>Elastic Search</a:t>
-              </a:r>
-              <a:r>
-                <a:rPr lang="en-US" sz="3000">
-                  <a:solidFill>
-                    <a:schemeClr val="dk1"/>
-                  </a:solidFill>
-                  <a:latin typeface="Inter"/>
-                  <a:ea typeface="Inter"/>
-                  <a:cs typeface="Inter"/>
-                  <a:sym typeface="Inter"/>
-                </a:rPr>
-                <a:t>: Powerful ranking &amp; distributed storage</a:t>
-              </a:r>
-              <a:endParaRPr sz="3000">
-                <a:solidFill>
-                  <a:schemeClr val="dk1"/>
-                </a:solidFill>
-                <a:latin typeface="Inter"/>
-                <a:ea typeface="Inter"/>
-                <a:cs typeface="Inter"/>
-                <a:sym typeface="Inter"/>
-              </a:endParaRPr>
-            </a:p>
-            <a:p>
-              <a:pPr indent="0" lvl="0" marL="0" rtl="0" algn="l">
-                <a:lnSpc>
-                  <a:spcPct val="140000"/>
-                </a:lnSpc>
-                <a:spcBef>
-                  <a:spcPts val="0"/>
-                </a:spcBef>
-                <a:spcAft>
-                  <a:spcPts val="0"/>
-                </a:spcAft>
-                <a:buClr>
-                  <a:schemeClr val="dk1"/>
-                </a:buClr>
-                <a:buSzPts val="1100"/>
-                <a:buFont typeface="Arial"/>
-                <a:buNone/>
-              </a:pPr>
-              <a:r>
-                <a:rPr lang="en-US" sz="3000">
-                  <a:solidFill>
-                    <a:schemeClr val="dk1"/>
-                  </a:solidFill>
-                  <a:latin typeface="Inter"/>
-                  <a:ea typeface="Inter"/>
-                  <a:cs typeface="Inter"/>
-                  <a:sym typeface="Inter"/>
-                </a:rPr>
-                <a:t>	•	</a:t>
-              </a:r>
-              <a:r>
-                <a:rPr b="1" lang="en-US" sz="3000">
-                  <a:solidFill>
-                    <a:schemeClr val="dk1"/>
-                  </a:solidFill>
-                  <a:latin typeface="Inter"/>
-                  <a:ea typeface="Inter"/>
-                  <a:cs typeface="Inter"/>
-                  <a:sym typeface="Inter"/>
-                </a:rPr>
-                <a:t>FAISS</a:t>
-              </a:r>
-              <a:r>
-                <a:rPr lang="en-US" sz="3000">
-                  <a:solidFill>
-                    <a:schemeClr val="dk1"/>
-                  </a:solidFill>
-                  <a:latin typeface="Inter"/>
-                  <a:ea typeface="Inter"/>
-                  <a:cs typeface="Inter"/>
-                  <a:sym typeface="Inter"/>
-                </a:rPr>
-                <a:t>: Fast, in-memory, no CRUD support</a:t>
-              </a:r>
-              <a:endParaRPr sz="3000">
-                <a:solidFill>
-                  <a:schemeClr val="dk1"/>
-                </a:solidFill>
-                <a:latin typeface="Inter"/>
-                <a:ea typeface="Inter"/>
-                <a:cs typeface="Inter"/>
-                <a:sym typeface="Inter"/>
-              </a:endParaRPr>
-            </a:p>
-            <a:p>
-              <a:pPr indent="0" lvl="0" marL="0" rtl="0" algn="l">
-                <a:lnSpc>
-                  <a:spcPct val="140000"/>
-                </a:lnSpc>
-                <a:spcBef>
-                  <a:spcPts val="0"/>
-                </a:spcBef>
-                <a:spcAft>
-                  <a:spcPts val="0"/>
-                </a:spcAft>
-                <a:buClr>
-                  <a:schemeClr val="dk1"/>
-                </a:buClr>
-                <a:buSzPts val="1100"/>
-                <a:buFont typeface="Arial"/>
-                <a:buNone/>
-              </a:pPr>
-              <a:r>
-                <a:rPr lang="en-US" sz="3000">
-                  <a:solidFill>
-                    <a:schemeClr val="dk1"/>
-                  </a:solidFill>
-                  <a:latin typeface="Inter"/>
-                  <a:ea typeface="Inter"/>
-                  <a:cs typeface="Inter"/>
-                  <a:sym typeface="Inter"/>
-                </a:rPr>
-                <a:t>	•	</a:t>
-              </a:r>
-              <a:r>
-                <a:rPr b="1" lang="en-US" sz="3000">
-                  <a:solidFill>
-                    <a:schemeClr val="dk1"/>
-                  </a:solidFill>
-                  <a:latin typeface="Inter"/>
-                  <a:ea typeface="Inter"/>
-                  <a:cs typeface="Inter"/>
-                  <a:sym typeface="Inter"/>
-                </a:rPr>
-                <a:t>TF-IDF</a:t>
-              </a:r>
-              <a:r>
-                <a:rPr lang="en-US" sz="3000">
-                  <a:solidFill>
-                    <a:schemeClr val="dk1"/>
-                  </a:solidFill>
-                  <a:latin typeface="Inter"/>
-                  <a:ea typeface="Inter"/>
-                  <a:cs typeface="Inter"/>
-                  <a:sym typeface="Inter"/>
-                </a:rPr>
-                <a:t>: Simple, but slow for large datasets</a:t>
               </a:r>
               <a:endParaRPr sz="3000">
                 <a:solidFill>
@@ -20018,7 +19882,7 @@
     </p:bg>
     <p:spTree>
       <p:nvGrpSpPr>
-        <p:cNvPr id="220" name="Shape 220"/>
+        <p:cNvPr id="219" name="Shape 219"/>
         <p:cNvGrpSpPr/>
         <p:nvPr/>
       </p:nvGrpSpPr>
@@ -20032,21 +19896,21 @@
       </p:grpSpPr>
       <p:grpSp>
         <p:nvGrpSpPr>
-          <p:cNvPr id="221" name="Google Shape;221;g3232326fb21_0_169"/>
+          <p:cNvPr id="220" name="Google Shape;220;g3232326fb21_0_157"/>
           <p:cNvGrpSpPr/>
           <p:nvPr/>
         </p:nvGrpSpPr>
         <p:grpSpPr>
           <a:xfrm>
             <a:off x="1157550" y="2186825"/>
-            <a:ext cx="16009831" cy="7732625"/>
+            <a:ext cx="16009831" cy="5146700"/>
             <a:chOff x="-16" y="0"/>
-            <a:chExt cx="21132300" cy="10310167"/>
+            <a:chExt cx="21132300" cy="6862267"/>
           </a:xfrm>
         </p:grpSpPr>
         <p:sp>
           <p:nvSpPr>
-            <p:cNvPr id="222" name="Google Shape;222;g3232326fb21_0_169"/>
+            <p:cNvPr id="221" name="Google Shape;221;g3232326fb21_0_157"/>
             <p:cNvSpPr txBox="1"/>
             <p:nvPr/>
           </p:nvSpPr>
@@ -20112,7 +19976,378 @@
         </p:sp>
         <p:sp>
           <p:nvSpPr>
-            <p:cNvPr id="223" name="Google Shape;223;g3232326fb21_0_169"/>
+            <p:cNvPr id="222" name="Google Shape;222;g3232326fb21_0_157"/>
+            <p:cNvSpPr txBox="1"/>
+            <p:nvPr/>
+          </p:nvSpPr>
+          <p:spPr>
+            <a:xfrm>
+              <a:off x="-16" y="3660667"/>
+              <a:ext cx="21132300" cy="3201600"/>
+            </a:xfrm>
+            <a:prstGeom prst="rect">
+              <a:avLst/>
+            </a:prstGeom>
+            <a:noFill/>
+            <a:ln>
+              <a:noFill/>
+            </a:ln>
+          </p:spPr>
+          <p:txBody>
+            <a:bodyPr anchorCtr="0" anchor="t" bIns="0" lIns="0" spcFirstLastPara="1" rIns="0" wrap="square" tIns="0">
+              <a:spAutoFit/>
+            </a:bodyPr>
+            <a:lstStyle/>
+            <a:p>
+              <a:pPr indent="0" lvl="0" marL="0" rtl="0" algn="l">
+                <a:lnSpc>
+                  <a:spcPct val="140000"/>
+                </a:lnSpc>
+                <a:spcBef>
+                  <a:spcPts val="0"/>
+                </a:spcBef>
+                <a:spcAft>
+                  <a:spcPts val="0"/>
+                </a:spcAft>
+                <a:buClr>
+                  <a:schemeClr val="dk1"/>
+                </a:buClr>
+                <a:buSzPts val="1100"/>
+                <a:buFont typeface="Arial"/>
+                <a:buNone/>
+              </a:pPr>
+              <a:r>
+                <a:rPr b="1" lang="en-US" sz="3000">
+                  <a:solidFill>
+                    <a:schemeClr val="dk1"/>
+                  </a:solidFill>
+                  <a:latin typeface="Inter"/>
+                  <a:ea typeface="Inter"/>
+                  <a:cs typeface="Inter"/>
+                  <a:sym typeface="Inter"/>
+                </a:rPr>
+                <a:t>Search Methods</a:t>
+              </a:r>
+              <a:endParaRPr b="1" sz="3000">
+                <a:solidFill>
+                  <a:schemeClr val="dk1"/>
+                </a:solidFill>
+                <a:latin typeface="Inter"/>
+                <a:ea typeface="Inter"/>
+                <a:cs typeface="Inter"/>
+                <a:sym typeface="Inter"/>
+              </a:endParaRPr>
+            </a:p>
+            <a:p>
+              <a:pPr indent="0" lvl="0" marL="0" rtl="0" algn="l">
+                <a:lnSpc>
+                  <a:spcPct val="140000"/>
+                </a:lnSpc>
+                <a:spcBef>
+                  <a:spcPts val="0"/>
+                </a:spcBef>
+                <a:spcAft>
+                  <a:spcPts val="0"/>
+                </a:spcAft>
+                <a:buClr>
+                  <a:schemeClr val="dk1"/>
+                </a:buClr>
+                <a:buSzPts val="1100"/>
+                <a:buFont typeface="Arial"/>
+                <a:buNone/>
+              </a:pPr>
+              <a:r>
+                <a:rPr lang="en-US" sz="3000">
+                  <a:solidFill>
+                    <a:schemeClr val="dk1"/>
+                  </a:solidFill>
+                  <a:latin typeface="Inter"/>
+                  <a:ea typeface="Inter"/>
+                  <a:cs typeface="Inter"/>
+                  <a:sym typeface="Inter"/>
+                </a:rPr>
+                <a:t>	•	</a:t>
+              </a:r>
+              <a:r>
+                <a:rPr b="1" lang="en-US" sz="3000">
+                  <a:solidFill>
+                    <a:schemeClr val="dk1"/>
+                  </a:solidFill>
+                  <a:latin typeface="Inter"/>
+                  <a:ea typeface="Inter"/>
+                  <a:cs typeface="Inter"/>
+                  <a:sym typeface="Inter"/>
+                </a:rPr>
+                <a:t>Elastic Search</a:t>
+              </a:r>
+              <a:r>
+                <a:rPr lang="en-US" sz="3000">
+                  <a:solidFill>
+                    <a:schemeClr val="dk1"/>
+                  </a:solidFill>
+                  <a:latin typeface="Inter"/>
+                  <a:ea typeface="Inter"/>
+                  <a:cs typeface="Inter"/>
+                  <a:sym typeface="Inter"/>
+                </a:rPr>
+                <a:t>: Powerful ranking &amp; distributed storage</a:t>
+              </a:r>
+              <a:endParaRPr sz="3000">
+                <a:solidFill>
+                  <a:schemeClr val="dk1"/>
+                </a:solidFill>
+                <a:latin typeface="Inter"/>
+                <a:ea typeface="Inter"/>
+                <a:cs typeface="Inter"/>
+                <a:sym typeface="Inter"/>
+              </a:endParaRPr>
+            </a:p>
+            <a:p>
+              <a:pPr indent="0" lvl="0" marL="0" rtl="0" algn="l">
+                <a:lnSpc>
+                  <a:spcPct val="140000"/>
+                </a:lnSpc>
+                <a:spcBef>
+                  <a:spcPts val="0"/>
+                </a:spcBef>
+                <a:spcAft>
+                  <a:spcPts val="0"/>
+                </a:spcAft>
+                <a:buClr>
+                  <a:schemeClr val="dk1"/>
+                </a:buClr>
+                <a:buSzPts val="1100"/>
+                <a:buFont typeface="Arial"/>
+                <a:buNone/>
+              </a:pPr>
+              <a:r>
+                <a:rPr lang="en-US" sz="3000">
+                  <a:solidFill>
+                    <a:schemeClr val="dk1"/>
+                  </a:solidFill>
+                  <a:latin typeface="Inter"/>
+                  <a:ea typeface="Inter"/>
+                  <a:cs typeface="Inter"/>
+                  <a:sym typeface="Inter"/>
+                </a:rPr>
+                <a:t>	•	</a:t>
+              </a:r>
+              <a:r>
+                <a:rPr b="1" lang="en-US" sz="3000">
+                  <a:solidFill>
+                    <a:schemeClr val="dk1"/>
+                  </a:solidFill>
+                  <a:latin typeface="Inter"/>
+                  <a:ea typeface="Inter"/>
+                  <a:cs typeface="Inter"/>
+                  <a:sym typeface="Inter"/>
+                </a:rPr>
+                <a:t>FAISS</a:t>
+              </a:r>
+              <a:r>
+                <a:rPr lang="en-US" sz="3000">
+                  <a:solidFill>
+                    <a:schemeClr val="dk1"/>
+                  </a:solidFill>
+                  <a:latin typeface="Inter"/>
+                  <a:ea typeface="Inter"/>
+                  <a:cs typeface="Inter"/>
+                  <a:sym typeface="Inter"/>
+                </a:rPr>
+                <a:t>: Fast, in-memory, no CRUD support</a:t>
+              </a:r>
+              <a:endParaRPr sz="3000">
+                <a:solidFill>
+                  <a:schemeClr val="dk1"/>
+                </a:solidFill>
+                <a:latin typeface="Inter"/>
+                <a:ea typeface="Inter"/>
+                <a:cs typeface="Inter"/>
+                <a:sym typeface="Inter"/>
+              </a:endParaRPr>
+            </a:p>
+            <a:p>
+              <a:pPr indent="0" lvl="0" marL="0" rtl="0" algn="l">
+                <a:lnSpc>
+                  <a:spcPct val="140000"/>
+                </a:lnSpc>
+                <a:spcBef>
+                  <a:spcPts val="0"/>
+                </a:spcBef>
+                <a:spcAft>
+                  <a:spcPts val="0"/>
+                </a:spcAft>
+                <a:buClr>
+                  <a:schemeClr val="dk1"/>
+                </a:buClr>
+                <a:buSzPts val="1100"/>
+                <a:buFont typeface="Arial"/>
+                <a:buNone/>
+              </a:pPr>
+              <a:r>
+                <a:rPr lang="en-US" sz="3000">
+                  <a:solidFill>
+                    <a:schemeClr val="dk1"/>
+                  </a:solidFill>
+                  <a:latin typeface="Inter"/>
+                  <a:ea typeface="Inter"/>
+                  <a:cs typeface="Inter"/>
+                  <a:sym typeface="Inter"/>
+                </a:rPr>
+                <a:t>	•	</a:t>
+              </a:r>
+              <a:r>
+                <a:rPr b="1" lang="en-US" sz="3000">
+                  <a:solidFill>
+                    <a:schemeClr val="dk1"/>
+                  </a:solidFill>
+                  <a:latin typeface="Inter"/>
+                  <a:ea typeface="Inter"/>
+                  <a:cs typeface="Inter"/>
+                  <a:sym typeface="Inter"/>
+                </a:rPr>
+                <a:t>TF-IDF</a:t>
+              </a:r>
+              <a:r>
+                <a:rPr lang="en-US" sz="3000">
+                  <a:solidFill>
+                    <a:schemeClr val="dk1"/>
+                  </a:solidFill>
+                  <a:latin typeface="Inter"/>
+                  <a:ea typeface="Inter"/>
+                  <a:cs typeface="Inter"/>
+                  <a:sym typeface="Inter"/>
+                </a:rPr>
+                <a:t>: Simple, but slow for large datasets</a:t>
+              </a:r>
+              <a:endParaRPr sz="3000">
+                <a:solidFill>
+                  <a:schemeClr val="dk1"/>
+                </a:solidFill>
+                <a:latin typeface="Inter"/>
+                <a:ea typeface="Inter"/>
+                <a:cs typeface="Inter"/>
+                <a:sym typeface="Inter"/>
+              </a:endParaRPr>
+            </a:p>
+          </p:txBody>
+        </p:sp>
+      </p:grpSp>
+    </p:spTree>
+  </p:cSld>
+  <p:clrMapOvr>
+    <a:masterClrMapping/>
+  </p:clrMapOvr>
+</p:sld>
+</file>
+
+<file path=ppt/slides/slide21.xml><?xml version="1.0" encoding="utf-8"?>
+<p:sld xmlns:a="http://schemas.openxmlformats.org/drawingml/2006/main" xmlns:r="http://schemas.openxmlformats.org/officeDocument/2006/relationships" xmlns:mc="http://schemas.openxmlformats.org/markup-compatibility/2006" xmlns:mv="urn:schemas-microsoft-com:mac:vml" xmlns:p="http://schemas.openxmlformats.org/presentationml/2006/main" xmlns:c="http://schemas.openxmlformats.org/drawingml/2006/chart" xmlns:dgm="http://schemas.openxmlformats.org/drawingml/2006/diagram" xmlns:o="urn:schemas-microsoft-com:office:office" xmlns:v="urn:schemas-microsoft-com:vml" xmlns:pvml="urn:schemas-microsoft-com:office:powerpoint" xmlns:com="http://schemas.openxmlformats.org/drawingml/2006/compatibility" xmlns:p14="http://schemas.microsoft.com/office/powerpoint/2010/main" xmlns:p15="http://schemas.microsoft.com/office/powerpoint/2012/main" xmlns:ahyp="http://schemas.microsoft.com/office/drawing/2018/hyperlinkcolor">
+  <p:cSld>
+    <p:bg>
+      <p:bgPr>
+        <a:solidFill>
+          <a:srgbClr val="F1F1F1"/>
+        </a:solidFill>
+      </p:bgPr>
+    </p:bg>
+    <p:spTree>
+      <p:nvGrpSpPr>
+        <p:cNvPr id="226" name="Shape 226"/>
+        <p:cNvGrpSpPr/>
+        <p:nvPr/>
+      </p:nvGrpSpPr>
+      <p:grpSpPr>
+        <a:xfrm>
+          <a:off x="0" y="0"/>
+          <a:ext cx="0" cy="0"/>
+          <a:chOff x="0" y="0"/>
+          <a:chExt cx="0" cy="0"/>
+        </a:xfrm>
+      </p:grpSpPr>
+      <p:grpSp>
+        <p:nvGrpSpPr>
+          <p:cNvPr id="227" name="Google Shape;227;g3232326fb21_0_169"/>
+          <p:cNvGrpSpPr/>
+          <p:nvPr/>
+        </p:nvGrpSpPr>
+        <p:grpSpPr>
+          <a:xfrm>
+            <a:off x="1157550" y="2186825"/>
+            <a:ext cx="16009831" cy="7732625"/>
+            <a:chOff x="-16" y="0"/>
+            <a:chExt cx="21132300" cy="10310167"/>
+          </a:xfrm>
+        </p:grpSpPr>
+        <p:sp>
+          <p:nvSpPr>
+            <p:cNvPr id="228" name="Google Shape;228;g3232326fb21_0_169"/>
+            <p:cNvSpPr txBox="1"/>
+            <p:nvPr/>
+          </p:nvSpPr>
+          <p:spPr>
+            <a:xfrm>
+              <a:off x="-16" y="0"/>
+              <a:ext cx="21132300" cy="1539000"/>
+            </a:xfrm>
+            <a:prstGeom prst="rect">
+              <a:avLst/>
+            </a:prstGeom>
+            <a:noFill/>
+            <a:ln>
+              <a:noFill/>
+            </a:ln>
+          </p:spPr>
+          <p:txBody>
+            <a:bodyPr anchorCtr="0" anchor="t" bIns="0" lIns="0" spcFirstLastPara="1" rIns="0" wrap="square" tIns="0">
+              <a:spAutoFit/>
+            </a:bodyPr>
+            <a:lstStyle/>
+            <a:p>
+              <a:pPr indent="0" lvl="0" marL="0" rtl="0" algn="l">
+                <a:lnSpc>
+                  <a:spcPct val="120002"/>
+                </a:lnSpc>
+                <a:spcBef>
+                  <a:spcPts val="0"/>
+                </a:spcBef>
+                <a:spcAft>
+                  <a:spcPts val="0"/>
+                </a:spcAft>
+                <a:buClr>
+                  <a:schemeClr val="dk1"/>
+                </a:buClr>
+                <a:buSzPts val="7499"/>
+                <a:buFont typeface="Arial"/>
+                <a:buNone/>
+              </a:pPr>
+              <a:r>
+                <a:rPr b="1" lang="en-US" sz="7499">
+                  <a:solidFill>
+                    <a:srgbClr val="9976FF"/>
+                  </a:solidFill>
+                  <a:latin typeface="Inter"/>
+                  <a:ea typeface="Inter"/>
+                  <a:cs typeface="Inter"/>
+                  <a:sym typeface="Inter"/>
+                </a:rPr>
+                <a:t>Comparison of Approaches</a:t>
+              </a:r>
+              <a:endParaRPr b="1" sz="7499">
+                <a:solidFill>
+                  <a:srgbClr val="9976FF"/>
+                </a:solidFill>
+                <a:latin typeface="Inter"/>
+                <a:ea typeface="Inter"/>
+                <a:cs typeface="Inter"/>
+                <a:sym typeface="Inter"/>
+              </a:endParaRPr>
+            </a:p>
+          </p:txBody>
+        </p:sp>
+        <p:sp>
+          <p:nvSpPr>
+            <p:cNvPr id="229" name="Google Shape;229;g3232326fb21_0_169"/>
             <p:cNvSpPr txBox="1"/>
             <p:nvPr/>
           </p:nvSpPr>
@@ -20576,7 +20811,7 @@
 </p:sld>
 </file>
 
-<file path=ppt/slides/slide21.xml><?xml version="1.0" encoding="utf-8"?>
+<file path=ppt/slides/slide22.xml><?xml version="1.0" encoding="utf-8"?>
 <p:sld xmlns:a="http://schemas.openxmlformats.org/drawingml/2006/main" xmlns:r="http://schemas.openxmlformats.org/officeDocument/2006/relationships" xmlns:mc="http://schemas.openxmlformats.org/markup-compatibility/2006" xmlns:mv="urn:schemas-microsoft-com:mac:vml" xmlns:p="http://schemas.openxmlformats.org/presentationml/2006/main" xmlns:c="http://schemas.openxmlformats.org/drawingml/2006/chart" xmlns:dgm="http://schemas.openxmlformats.org/drawingml/2006/diagram" xmlns:o="urn:schemas-microsoft-com:office:office" xmlns:v="urn:schemas-microsoft-com:vml" xmlns:pvml="urn:schemas-microsoft-com:office:powerpoint" xmlns:com="http://schemas.openxmlformats.org/drawingml/2006/compatibility" xmlns:p14="http://schemas.microsoft.com/office/powerpoint/2010/main" xmlns:p15="http://schemas.microsoft.com/office/powerpoint/2012/main" xmlns:ahyp="http://schemas.microsoft.com/office/drawing/2018/hyperlinkcolor">
   <p:cSld>
     <p:bg>
@@ -20588,7 +20823,7 @@
     </p:bg>
     <p:spTree>
       <p:nvGrpSpPr>
-        <p:cNvPr id="227" name="Shape 227"/>
+        <p:cNvPr id="233" name="Shape 233"/>
         <p:cNvGrpSpPr/>
         <p:nvPr/>
       </p:nvGrpSpPr>
@@ -20602,7 +20837,7 @@
       </p:grpSpPr>
       <p:grpSp>
         <p:nvGrpSpPr>
-          <p:cNvPr id="228" name="Google Shape;228;g3232326fb21_0_176"/>
+          <p:cNvPr id="234" name="Google Shape;234;g3232326fb21_0_176"/>
           <p:cNvGrpSpPr/>
           <p:nvPr/>
         </p:nvGrpSpPr>
@@ -20616,7 +20851,7 @@
         </p:grpSpPr>
         <p:sp>
           <p:nvSpPr>
-            <p:cNvPr id="229" name="Google Shape;229;g3232326fb21_0_176"/>
+            <p:cNvPr id="235" name="Google Shape;235;g3232326fb21_0_176"/>
             <p:cNvSpPr txBox="1"/>
             <p:nvPr/>
           </p:nvSpPr>
@@ -20682,7 +20917,7 @@
         </p:sp>
         <p:sp>
           <p:nvSpPr>
-            <p:cNvPr id="230" name="Google Shape;230;g3232326fb21_0_176"/>
+            <p:cNvPr id="236" name="Google Shape;236;g3232326fb21_0_176"/>
             <p:cNvSpPr txBox="1"/>
             <p:nvPr/>
           </p:nvSpPr>
@@ -21186,7 +21421,7 @@
 </p:sld>
 </file>
 
-<file path=ppt/slides/slide22.xml><?xml version="1.0" encoding="utf-8"?>
+<file path=ppt/slides/slide23.xml><?xml version="1.0" encoding="utf-8"?>
 <p:sld xmlns:a="http://schemas.openxmlformats.org/drawingml/2006/main" xmlns:r="http://schemas.openxmlformats.org/officeDocument/2006/relationships" xmlns:mc="http://schemas.openxmlformats.org/markup-compatibility/2006" xmlns:mv="urn:schemas-microsoft-com:mac:vml" xmlns:p="http://schemas.openxmlformats.org/presentationml/2006/main" xmlns:c="http://schemas.openxmlformats.org/drawingml/2006/chart" xmlns:dgm="http://schemas.openxmlformats.org/drawingml/2006/diagram" xmlns:o="urn:schemas-microsoft-com:office:office" xmlns:v="urn:schemas-microsoft-com:vml" xmlns:pvml="urn:schemas-microsoft-com:office:powerpoint" xmlns:com="http://schemas.openxmlformats.org/drawingml/2006/compatibility" xmlns:p14="http://schemas.microsoft.com/office/powerpoint/2010/main" xmlns:p15="http://schemas.microsoft.com/office/powerpoint/2012/main" xmlns:ahyp="http://schemas.microsoft.com/office/drawing/2018/hyperlinkcolor">
   <p:cSld>
     <p:bg>
@@ -21198,7 +21433,7 @@
     </p:bg>
     <p:spTree>
       <p:nvGrpSpPr>
-        <p:cNvPr id="234" name="Shape 234"/>
+        <p:cNvPr id="240" name="Shape 240"/>
         <p:cNvGrpSpPr/>
         <p:nvPr/>
       </p:nvGrpSpPr>
@@ -21212,7 +21447,7 @@
       </p:grpSpPr>
       <p:sp>
         <p:nvSpPr>
-          <p:cNvPr id="235" name="Google Shape;235;g3232326fb21_0_201"/>
+          <p:cNvPr id="241" name="Google Shape;241;g3232326fb21_0_201"/>
           <p:cNvSpPr txBox="1"/>
           <p:nvPr/>
         </p:nvSpPr>
@@ -21269,7 +21504,7 @@
       </p:sp>
       <p:pic>
         <p:nvPicPr>
-          <p:cNvPr id="236" name="Google Shape;236;g3232326fb21_0_201"/>
+          <p:cNvPr id="242" name="Google Shape;242;g3232326fb21_0_201"/>
           <p:cNvPicPr preferRelativeResize="0"/>
           <p:nvPr/>
         </p:nvPicPr>
@@ -21302,7 +21537,7 @@
 </p:sld>
 </file>
 
-<file path=ppt/slides/slide23.xml><?xml version="1.0" encoding="utf-8"?>
+<file path=ppt/slides/slide24.xml><?xml version="1.0" encoding="utf-8"?>
 <p:sld xmlns:a="http://schemas.openxmlformats.org/drawingml/2006/main" xmlns:r="http://schemas.openxmlformats.org/officeDocument/2006/relationships" xmlns:mc="http://schemas.openxmlformats.org/markup-compatibility/2006" xmlns:mv="urn:schemas-microsoft-com:mac:vml" xmlns:p="http://schemas.openxmlformats.org/presentationml/2006/main" xmlns:c="http://schemas.openxmlformats.org/drawingml/2006/chart" xmlns:dgm="http://schemas.openxmlformats.org/drawingml/2006/diagram" xmlns:o="urn:schemas-microsoft-com:office:office" xmlns:v="urn:schemas-microsoft-com:vml" xmlns:pvml="urn:schemas-microsoft-com:office:powerpoint" xmlns:com="http://schemas.openxmlformats.org/drawingml/2006/compatibility" xmlns:p14="http://schemas.microsoft.com/office/powerpoint/2010/main" xmlns:p15="http://schemas.microsoft.com/office/powerpoint/2012/main" xmlns:ahyp="http://schemas.microsoft.com/office/drawing/2018/hyperlinkcolor">
   <p:cSld>
     <p:bg>
@@ -21314,7 +21549,7 @@
     </p:bg>
     <p:spTree>
       <p:nvGrpSpPr>
-        <p:cNvPr id="240" name="Shape 240"/>
+        <p:cNvPr id="246" name="Shape 246"/>
         <p:cNvGrpSpPr/>
         <p:nvPr/>
       </p:nvGrpSpPr>
@@ -21328,7 +21563,7 @@
       </p:grpSpPr>
       <p:sp>
         <p:nvSpPr>
-          <p:cNvPr id="241" name="Google Shape;241;p14"/>
+          <p:cNvPr id="247" name="Google Shape;247;p14"/>
           <p:cNvSpPr txBox="1"/>
           <p:nvPr/>
         </p:nvSpPr>
@@ -21394,7 +21629,7 @@
       </p:sp>
       <p:sp>
         <p:nvSpPr>
-          <p:cNvPr id="242" name="Google Shape;242;p14"/>
+          <p:cNvPr id="248" name="Google Shape;248;p14"/>
           <p:cNvSpPr txBox="1"/>
           <p:nvPr/>
         </p:nvSpPr>
@@ -21460,7 +21695,7 @@
       </p:sp>
       <p:sp>
         <p:nvSpPr>
-          <p:cNvPr id="243" name="Google Shape;243;p14"/>
+          <p:cNvPr id="249" name="Google Shape;249;p14"/>
           <p:cNvSpPr/>
           <p:nvPr/>
         </p:nvSpPr>

</xml_diff>